<commit_message>
fiz algumas alterações no site, no banco de dados e no ppt da apresentação
</commit_message>
<xml_diff>
--- a/ppt/Projeto Individual.pptx
+++ b/ppt/Projeto Individual.pptx
@@ -846,7 +846,7 @@
             <a:fld id="{B61BEF0D-F0BB-DE4B-95CE-6DB70DBA9567}" type="datetimeFigureOut">
               <a:rPr lang="en-US" smtClean="0"/>
               <a:pPr/>
-              <a:t>11/28/2022</a:t>
+              <a:t>11/30/2022</a:t>
             </a:fld>
             <a:endParaRPr lang="en-US" dirty="0"/>
           </a:p>
@@ -1099,7 +1099,7 @@
             <a:fld id="{B61BEF0D-F0BB-DE4B-95CE-6DB70DBA9567}" type="datetimeFigureOut">
               <a:rPr lang="en-US" smtClean="0"/>
               <a:pPr/>
-              <a:t>11/28/2022</a:t>
+              <a:t>11/30/2022</a:t>
             </a:fld>
             <a:endParaRPr lang="en-US" dirty="0"/>
           </a:p>
@@ -1415,7 +1415,7 @@
             <a:fld id="{B61BEF0D-F0BB-DE4B-95CE-6DB70DBA9567}" type="datetimeFigureOut">
               <a:rPr lang="en-US" smtClean="0"/>
               <a:pPr/>
-              <a:t>11/28/2022</a:t>
+              <a:t>11/30/2022</a:t>
             </a:fld>
             <a:endParaRPr lang="en-US" dirty="0"/>
           </a:p>
@@ -1758,7 +1758,7 @@
             <a:fld id="{B61BEF0D-F0BB-DE4B-95CE-6DB70DBA9567}" type="datetimeFigureOut">
               <a:rPr lang="en-US" smtClean="0"/>
               <a:pPr/>
-              <a:t>11/28/2022</a:t>
+              <a:t>11/30/2022</a:t>
             </a:fld>
             <a:endParaRPr lang="en-US" dirty="0"/>
           </a:p>
@@ -2074,7 +2074,7 @@
             <a:fld id="{B61BEF0D-F0BB-DE4B-95CE-6DB70DBA9567}" type="datetimeFigureOut">
               <a:rPr lang="en-US" smtClean="0"/>
               <a:pPr/>
-              <a:t>11/28/2022</a:t>
+              <a:t>11/30/2022</a:t>
             </a:fld>
             <a:endParaRPr lang="en-US" dirty="0"/>
           </a:p>
@@ -2469,7 +2469,7 @@
             <a:fld id="{B61BEF0D-F0BB-DE4B-95CE-6DB70DBA9567}" type="datetimeFigureOut">
               <a:rPr lang="en-US" smtClean="0"/>
               <a:pPr/>
-              <a:t>11/28/2022</a:t>
+              <a:t>11/30/2022</a:t>
             </a:fld>
             <a:endParaRPr lang="en-US" dirty="0"/>
           </a:p>
@@ -2640,7 +2640,7 @@
           <a:p>
             <a:fld id="{55C6B4A9-1611-4792-9094-5F34BCA07E0B}" type="datetimeFigureOut">
               <a:rPr lang="en-US" smtClean="0"/>
-              <a:t>11/28/2022</a:t>
+              <a:t>11/30/2022</a:t>
             </a:fld>
             <a:endParaRPr lang="en-US" dirty="0"/>
           </a:p>
@@ -2821,7 +2821,7 @@
             <a:fld id="{B61BEF0D-F0BB-DE4B-95CE-6DB70DBA9567}" type="datetimeFigureOut">
               <a:rPr lang="en-US" smtClean="0"/>
               <a:pPr/>
-              <a:t>11/28/2022</a:t>
+              <a:t>11/30/2022</a:t>
             </a:fld>
             <a:endParaRPr lang="en-US" dirty="0"/>
           </a:p>
@@ -2999,7 +2999,7 @@
             <a:fld id="{B61BEF0D-F0BB-DE4B-95CE-6DB70DBA9567}" type="datetimeFigureOut">
               <a:rPr lang="en-US" smtClean="0"/>
               <a:pPr/>
-              <a:t>11/28/2022</a:t>
+              <a:t>11/30/2022</a:t>
             </a:fld>
             <a:endParaRPr lang="en-US" dirty="0"/>
           </a:p>
@@ -3248,7 +3248,7 @@
             <a:fld id="{B61BEF0D-F0BB-DE4B-95CE-6DB70DBA9567}" type="datetimeFigureOut">
               <a:rPr lang="en-US" smtClean="0"/>
               <a:pPr/>
-              <a:t>11/28/2022</a:t>
+              <a:t>11/30/2022</a:t>
             </a:fld>
             <a:endParaRPr lang="en-US" dirty="0"/>
           </a:p>
@@ -3481,7 +3481,7 @@
           <a:p>
             <a:fld id="{EB712588-04B1-427B-82EE-E8DB90309F08}" type="datetimeFigureOut">
               <a:rPr lang="en-US" smtClean="0"/>
-              <a:t>11/28/2022</a:t>
+              <a:t>11/30/2022</a:t>
             </a:fld>
             <a:endParaRPr lang="en-US" dirty="0"/>
           </a:p>
@@ -3856,7 +3856,7 @@
             <a:fld id="{B61BEF0D-F0BB-DE4B-95CE-6DB70DBA9567}" type="datetimeFigureOut">
               <a:rPr lang="en-US" smtClean="0"/>
               <a:pPr/>
-              <a:t>11/28/2022</a:t>
+              <a:t>11/30/2022</a:t>
             </a:fld>
             <a:endParaRPr lang="en-US" dirty="0"/>
           </a:p>
@@ -3981,7 +3981,7 @@
             <a:fld id="{B61BEF0D-F0BB-DE4B-95CE-6DB70DBA9567}" type="datetimeFigureOut">
               <a:rPr lang="en-US" smtClean="0"/>
               <a:pPr/>
-              <a:t>11/28/2022</a:t>
+              <a:t>11/30/2022</a:t>
             </a:fld>
             <a:endParaRPr lang="en-US" dirty="0"/>
           </a:p>
@@ -4078,7 +4078,7 @@
             <a:fld id="{B61BEF0D-F0BB-DE4B-95CE-6DB70DBA9567}" type="datetimeFigureOut">
               <a:rPr lang="en-US" smtClean="0"/>
               <a:pPr/>
-              <a:t>11/28/2022</a:t>
+              <a:t>11/30/2022</a:t>
             </a:fld>
             <a:endParaRPr lang="en-US" dirty="0"/>
           </a:p>
@@ -4334,7 +4334,7 @@
           <a:p>
             <a:fld id="{42A54C80-263E-416B-A8E0-580EDEADCBDC}" type="datetimeFigureOut">
               <a:rPr lang="en-US" smtClean="0"/>
-              <a:t>11/28/2022</a:t>
+              <a:t>11/30/2022</a:t>
             </a:fld>
             <a:endParaRPr lang="en-US" dirty="0"/>
           </a:p>
@@ -4598,7 +4598,7 @@
             <a:fld id="{B61BEF0D-F0BB-DE4B-95CE-6DB70DBA9567}" type="datetimeFigureOut">
               <a:rPr lang="en-US" smtClean="0"/>
               <a:pPr/>
-              <a:t>11/28/2022</a:t>
+              <a:t>11/30/2022</a:t>
             </a:fld>
             <a:endParaRPr lang="en-US" dirty="0"/>
           </a:p>
@@ -5343,7 +5343,7 @@
             <a:fld id="{B61BEF0D-F0BB-DE4B-95CE-6DB70DBA9567}" type="datetimeFigureOut">
               <a:rPr lang="en-US" smtClean="0"/>
               <a:pPr/>
-              <a:t>11/28/2022</a:t>
+              <a:t>11/30/2022</a:t>
             </a:fld>
             <a:endParaRPr lang="en-US" dirty="0"/>
           </a:p>
@@ -6024,13 +6024,19 @@
           <a:p>
             <a:r>
               <a:rPr lang="pt-BR" sz="3000" dirty="0"/>
-              <a:t>Funcionamento da API</a:t>
+              <a:t>Entender a API</a:t>
             </a:r>
           </a:p>
           <a:p>
             <a:r>
               <a:rPr lang="pt-BR" sz="3000" dirty="0"/>
               <a:t>Ideias</a:t>
+            </a:r>
+          </a:p>
+          <a:p>
+            <a:r>
+              <a:rPr lang="pt-BR" sz="3000" dirty="0"/>
+              <a:t>Pedir ajuda</a:t>
             </a:r>
           </a:p>
         </p:txBody>
@@ -6129,6 +6135,12 @@
             </a:r>
           </a:p>
           <a:p>
+            <a:r>
+              <a:rPr lang="pt-BR" sz="3000" dirty="0"/>
+              <a:t>Meu grupo de PI</a:t>
+            </a:r>
+          </a:p>
+          <a:p>
             <a:endParaRPr lang="pt-BR" sz="3000" dirty="0"/>
           </a:p>
           <a:p>
@@ -6210,13 +6222,13 @@
   <p:clrMapOvr>
     <a:masterClrMapping/>
   </p:clrMapOvr>
-  <mc:AlternateContent xmlns:mc="http://schemas.openxmlformats.org/markup-compatibility/2006">
-    <mc:Choice xmlns:p14="http://schemas.microsoft.com/office/powerpoint/2010/main" Requires="p14">
+  <mc:AlternateContent xmlns:mc="http://schemas.openxmlformats.org/markup-compatibility/2006" xmlns:p14="http://schemas.microsoft.com/office/powerpoint/2010/main">
+    <mc:Choice Requires="p14">
       <p:transition spd="slow" p14:dur="1500">
         <p:split orient="vert"/>
       </p:transition>
     </mc:Choice>
-    <mc:Fallback>
+    <mc:Fallback xmlns="">
       <p:transition spd="slow">
         <p:split orient="vert"/>
       </p:transition>
@@ -6264,7 +6276,7 @@
         </p:blipFill>
         <p:spPr>
           <a:xfrm>
-            <a:off x="1504121" y="2255578"/>
+            <a:off x="2471530" y="2255578"/>
             <a:ext cx="7248939" cy="2346844"/>
           </a:xfrm>
           <a:prstGeom prst="rect">
@@ -6563,7 +6575,7 @@
         </p:blipFill>
         <p:spPr>
           <a:xfrm>
-            <a:off x="4580645" y="1896891"/>
+            <a:off x="4580645" y="1913645"/>
             <a:ext cx="3030710" cy="3030710"/>
           </a:xfrm>
         </p:spPr>
@@ -6840,13 +6852,13 @@
   <p:clrMapOvr>
     <a:masterClrMapping/>
   </p:clrMapOvr>
-  <mc:AlternateContent xmlns:mc="http://schemas.openxmlformats.org/markup-compatibility/2006">
-    <mc:Choice xmlns:p14="http://schemas.microsoft.com/office/powerpoint/2010/main" Requires="p14">
+  <mc:AlternateContent xmlns:mc="http://schemas.openxmlformats.org/markup-compatibility/2006" xmlns:p14="http://schemas.microsoft.com/office/powerpoint/2010/main">
+    <mc:Choice Requires="p14">
       <p:transition spd="slow" p14:dur="3400">
         <p14:reveal/>
       </p:transition>
     </mc:Choice>
-    <mc:Fallback>
+    <mc:Fallback xmlns="">
       <p:transition spd="slow">
         <p:fade/>
       </p:transition>
@@ -6970,13 +6982,13 @@
   <p:clrMapOvr>
     <a:masterClrMapping/>
   </p:clrMapOvr>
-  <mc:AlternateContent xmlns:mc="http://schemas.openxmlformats.org/markup-compatibility/2006">
-    <mc:Choice xmlns:p14="http://schemas.microsoft.com/office/powerpoint/2010/main" Requires="p14">
+  <mc:AlternateContent xmlns:mc="http://schemas.openxmlformats.org/markup-compatibility/2006" xmlns:p14="http://schemas.microsoft.com/office/powerpoint/2010/main">
+    <mc:Choice Requires="p14">
       <p:transition spd="slow" p14:dur="1500">
         <p:split orient="vert"/>
       </p:transition>
     </mc:Choice>
-    <mc:Fallback>
+    <mc:Fallback xmlns="">
       <p:transition spd="slow">
         <p:split orient="vert"/>
       </p:transition>

</xml_diff>

<commit_message>
Ajustei o ppt da apresentação e adicionei os textos de explicações dos meus jogos favoritos
</commit_message>
<xml_diff>
--- a/ppt/Projeto Individual.pptx
+++ b/ppt/Projeto Individual.pptx
@@ -846,7 +846,7 @@
             <a:fld id="{B61BEF0D-F0BB-DE4B-95CE-6DB70DBA9567}" type="datetimeFigureOut">
               <a:rPr lang="en-US" smtClean="0"/>
               <a:pPr/>
-              <a:t>11/30/2022</a:t>
+              <a:t>12/1/2022</a:t>
             </a:fld>
             <a:endParaRPr lang="en-US" dirty="0"/>
           </a:p>
@@ -1099,7 +1099,7 @@
             <a:fld id="{B61BEF0D-F0BB-DE4B-95CE-6DB70DBA9567}" type="datetimeFigureOut">
               <a:rPr lang="en-US" smtClean="0"/>
               <a:pPr/>
-              <a:t>11/30/2022</a:t>
+              <a:t>12/1/2022</a:t>
             </a:fld>
             <a:endParaRPr lang="en-US" dirty="0"/>
           </a:p>
@@ -1415,7 +1415,7 @@
             <a:fld id="{B61BEF0D-F0BB-DE4B-95CE-6DB70DBA9567}" type="datetimeFigureOut">
               <a:rPr lang="en-US" smtClean="0"/>
               <a:pPr/>
-              <a:t>11/30/2022</a:t>
+              <a:t>12/1/2022</a:t>
             </a:fld>
             <a:endParaRPr lang="en-US" dirty="0"/>
           </a:p>
@@ -1758,7 +1758,7 @@
             <a:fld id="{B61BEF0D-F0BB-DE4B-95CE-6DB70DBA9567}" type="datetimeFigureOut">
               <a:rPr lang="en-US" smtClean="0"/>
               <a:pPr/>
-              <a:t>11/30/2022</a:t>
+              <a:t>12/1/2022</a:t>
             </a:fld>
             <a:endParaRPr lang="en-US" dirty="0"/>
           </a:p>
@@ -2074,7 +2074,7 @@
             <a:fld id="{B61BEF0D-F0BB-DE4B-95CE-6DB70DBA9567}" type="datetimeFigureOut">
               <a:rPr lang="en-US" smtClean="0"/>
               <a:pPr/>
-              <a:t>11/30/2022</a:t>
+              <a:t>12/1/2022</a:t>
             </a:fld>
             <a:endParaRPr lang="en-US" dirty="0"/>
           </a:p>
@@ -2469,7 +2469,7 @@
             <a:fld id="{B61BEF0D-F0BB-DE4B-95CE-6DB70DBA9567}" type="datetimeFigureOut">
               <a:rPr lang="en-US" smtClean="0"/>
               <a:pPr/>
-              <a:t>11/30/2022</a:t>
+              <a:t>12/1/2022</a:t>
             </a:fld>
             <a:endParaRPr lang="en-US" dirty="0"/>
           </a:p>
@@ -2640,7 +2640,7 @@
           <a:p>
             <a:fld id="{55C6B4A9-1611-4792-9094-5F34BCA07E0B}" type="datetimeFigureOut">
               <a:rPr lang="en-US" smtClean="0"/>
-              <a:t>11/30/2022</a:t>
+              <a:t>12/1/2022</a:t>
             </a:fld>
             <a:endParaRPr lang="en-US" dirty="0"/>
           </a:p>
@@ -2821,7 +2821,7 @@
             <a:fld id="{B61BEF0D-F0BB-DE4B-95CE-6DB70DBA9567}" type="datetimeFigureOut">
               <a:rPr lang="en-US" smtClean="0"/>
               <a:pPr/>
-              <a:t>11/30/2022</a:t>
+              <a:t>12/1/2022</a:t>
             </a:fld>
             <a:endParaRPr lang="en-US" dirty="0"/>
           </a:p>
@@ -2999,7 +2999,7 @@
             <a:fld id="{B61BEF0D-F0BB-DE4B-95CE-6DB70DBA9567}" type="datetimeFigureOut">
               <a:rPr lang="en-US" smtClean="0"/>
               <a:pPr/>
-              <a:t>11/30/2022</a:t>
+              <a:t>12/1/2022</a:t>
             </a:fld>
             <a:endParaRPr lang="en-US" dirty="0"/>
           </a:p>
@@ -3248,7 +3248,7 @@
             <a:fld id="{B61BEF0D-F0BB-DE4B-95CE-6DB70DBA9567}" type="datetimeFigureOut">
               <a:rPr lang="en-US" smtClean="0"/>
               <a:pPr/>
-              <a:t>11/30/2022</a:t>
+              <a:t>12/1/2022</a:t>
             </a:fld>
             <a:endParaRPr lang="en-US" dirty="0"/>
           </a:p>
@@ -3481,7 +3481,7 @@
           <a:p>
             <a:fld id="{EB712588-04B1-427B-82EE-E8DB90309F08}" type="datetimeFigureOut">
               <a:rPr lang="en-US" smtClean="0"/>
-              <a:t>11/30/2022</a:t>
+              <a:t>12/1/2022</a:t>
             </a:fld>
             <a:endParaRPr lang="en-US" dirty="0"/>
           </a:p>
@@ -3856,7 +3856,7 @@
             <a:fld id="{B61BEF0D-F0BB-DE4B-95CE-6DB70DBA9567}" type="datetimeFigureOut">
               <a:rPr lang="en-US" smtClean="0"/>
               <a:pPr/>
-              <a:t>11/30/2022</a:t>
+              <a:t>12/1/2022</a:t>
             </a:fld>
             <a:endParaRPr lang="en-US" dirty="0"/>
           </a:p>
@@ -3981,7 +3981,7 @@
             <a:fld id="{B61BEF0D-F0BB-DE4B-95CE-6DB70DBA9567}" type="datetimeFigureOut">
               <a:rPr lang="en-US" smtClean="0"/>
               <a:pPr/>
-              <a:t>11/30/2022</a:t>
+              <a:t>12/1/2022</a:t>
             </a:fld>
             <a:endParaRPr lang="en-US" dirty="0"/>
           </a:p>
@@ -4078,7 +4078,7 @@
             <a:fld id="{B61BEF0D-F0BB-DE4B-95CE-6DB70DBA9567}" type="datetimeFigureOut">
               <a:rPr lang="en-US" smtClean="0"/>
               <a:pPr/>
-              <a:t>11/30/2022</a:t>
+              <a:t>12/1/2022</a:t>
             </a:fld>
             <a:endParaRPr lang="en-US" dirty="0"/>
           </a:p>
@@ -4334,7 +4334,7 @@
           <a:p>
             <a:fld id="{42A54C80-263E-416B-A8E0-580EDEADCBDC}" type="datetimeFigureOut">
               <a:rPr lang="en-US" smtClean="0"/>
-              <a:t>11/30/2022</a:t>
+              <a:t>12/1/2022</a:t>
             </a:fld>
             <a:endParaRPr lang="en-US" dirty="0"/>
           </a:p>
@@ -4598,7 +4598,7 @@
             <a:fld id="{B61BEF0D-F0BB-DE4B-95CE-6DB70DBA9567}" type="datetimeFigureOut">
               <a:rPr lang="en-US" smtClean="0"/>
               <a:pPr/>
-              <a:t>11/30/2022</a:t>
+              <a:t>12/1/2022</a:t>
             </a:fld>
             <a:endParaRPr lang="en-US" dirty="0"/>
           </a:p>
@@ -5343,7 +5343,7 @@
             <a:fld id="{B61BEF0D-F0BB-DE4B-95CE-6DB70DBA9567}" type="datetimeFigureOut">
               <a:rPr lang="en-US" smtClean="0"/>
               <a:pPr/>
-              <a:t>11/30/2022</a:t>
+              <a:t>12/1/2022</a:t>
             </a:fld>
             <a:endParaRPr lang="en-US" dirty="0"/>
           </a:p>
@@ -5925,7 +5925,7 @@
                   <a:schemeClr val="tx1"/>
                 </a:solidFill>
               </a:rPr>
-              <a:t>Silvio Cesar Pintor Tavares</a:t>
+              <a:t>Silvio Tavares</a:t>
             </a:r>
           </a:p>
         </p:txBody>
@@ -6013,7 +6013,7 @@
           <a:p>
             <a:r>
               <a:rPr lang="pt-BR" sz="3000" dirty="0"/>
-              <a:t>Front-</a:t>
+              <a:t>Front </a:t>
             </a:r>
             <a:r>
               <a:rPr lang="pt-BR" sz="3000" dirty="0" err="1"/>
@@ -6455,7 +6455,7 @@
           <a:p>
             <a:r>
               <a:rPr lang="pt-BR" dirty="0"/>
-              <a:t>Amizades Online</a:t>
+              <a:t>Amizades</a:t>
             </a:r>
           </a:p>
         </p:txBody>
@@ -6934,7 +6934,7 @@
         </p:blipFill>
         <p:spPr>
           <a:xfrm>
-            <a:off x="938998" y="1930400"/>
+            <a:off x="1067107" y="1930400"/>
             <a:ext cx="8335004" cy="4021060"/>
           </a:xfrm>
           <a:prstGeom prst="rect">

</xml_diff>